<commit_message>
final proj 2 push
</commit_message>
<xml_diff>
--- a/project_2_powepoin.pptx
+++ b/project_2_powepoin.pptx
@@ -5705,9 +5705,29 @@
         <p:spPr/>
         <p:txBody>
           <a:bodyPr>
-            <a:normAutofit/>
+            <a:normAutofit fontScale="92500" lnSpcReduction="10000"/>
           </a:bodyPr>
           <a:lstStyle/>
+          <a:p>
+            <a:r>
+              <a:rPr lang="en-US" sz="2800" b="1" u="sng" dirty="0">
+                <a:latin typeface="Palatino" pitchFamily="2" charset="77"/>
+                <a:ea typeface="Palatino" pitchFamily="2" charset="77"/>
+              </a:rPr>
+              <a:t>Research Answer:</a:t>
+            </a:r>
+            <a:r>
+              <a:rPr lang="en-US" sz="2800" b="1" dirty="0">
+                <a:latin typeface="Palatino" pitchFamily="2" charset="77"/>
+                <a:ea typeface="Palatino" pitchFamily="2" charset="77"/>
+              </a:rPr>
+              <a:t> A player’s stats does in fact back the vote!</a:t>
+            </a:r>
+            <a:endParaRPr lang="en-US" sz="2800" dirty="0">
+              <a:latin typeface="Palatino" pitchFamily="2" charset="77"/>
+              <a:ea typeface="Palatino" pitchFamily="2" charset="77"/>
+            </a:endParaRPr>
+          </a:p>
           <a:p>
             <a:r>
               <a:rPr lang="en-US" sz="2400" dirty="0">
@@ -5748,6 +5768,9 @@
             </a:r>
           </a:p>
           <a:p>
+            <a:pPr marL="0" indent="0">
+              <a:buNone/>
+            </a:pPr>
             <a:endParaRPr lang="en-US" sz="2800" dirty="0">
               <a:latin typeface="Palatino" pitchFamily="2" charset="77"/>
               <a:ea typeface="Palatino" pitchFamily="2" charset="77"/>
@@ -5759,14 +5782,7 @@
                 <a:latin typeface="Palatino" pitchFamily="2" charset="77"/>
                 <a:ea typeface="Palatino" pitchFamily="2" charset="77"/>
               </a:rPr>
-              <a:t>Future Research: </a:t>
-            </a:r>
-            <a:r>
-              <a:rPr lang="en-US" sz="2800" b="1" dirty="0">
-                <a:latin typeface="Palatino" pitchFamily="2" charset="77"/>
-                <a:ea typeface="Palatino" pitchFamily="2" charset="77"/>
-              </a:rPr>
-              <a:t>Poisson Regression</a:t>
+              <a:t>Future Research: Poisson Regression</a:t>
             </a:r>
           </a:p>
         </p:txBody>
@@ -5853,21 +5869,9 @@
         <p:spPr/>
         <p:txBody>
           <a:bodyPr>
-            <a:normAutofit lnSpcReduction="10000"/>
+            <a:normAutofit fontScale="85000" lnSpcReduction="20000"/>
           </a:bodyPr>
           <a:lstStyle/>
-          <a:p>
-            <a:pPr marL="0" indent="0">
-              <a:buNone/>
-            </a:pPr>
-            <a:endParaRPr lang="en-US" dirty="0"/>
-          </a:p>
-          <a:p>
-            <a:pPr marL="0" indent="0">
-              <a:buNone/>
-            </a:pPr>
-            <a:endParaRPr lang="en-US" dirty="0"/>
-          </a:p>
           <a:p>
             <a:pPr marL="0" indent="0">
               <a:buNone/>
@@ -5896,6 +5900,31 @@
             <a:pPr marL="0" indent="0">
               <a:buNone/>
             </a:pPr>
+            <a:endParaRPr lang="en-US" sz="3600" dirty="0">
+              <a:latin typeface="Palatino" pitchFamily="2" charset="77"/>
+              <a:ea typeface="Palatino" pitchFamily="2" charset="77"/>
+            </a:endParaRPr>
+          </a:p>
+          <a:p>
+            <a:pPr marL="0" indent="0">
+              <a:buNone/>
+            </a:pPr>
+            <a:r>
+              <a:rPr lang="en-US" sz="3600" dirty="0" err="1">
+                <a:latin typeface="Palatino" pitchFamily="2" charset="77"/>
+                <a:ea typeface="Palatino" pitchFamily="2" charset="77"/>
+              </a:rPr>
+              <a:t>Alexlou.squarespace.com</a:t>
+            </a:r>
+            <a:endParaRPr lang="en-US" sz="3600" dirty="0">
+              <a:latin typeface="Palatino" pitchFamily="2" charset="77"/>
+              <a:ea typeface="Palatino" pitchFamily="2" charset="77"/>
+            </a:endParaRPr>
+          </a:p>
+          <a:p>
+            <a:pPr marL="0" indent="0">
+              <a:buNone/>
+            </a:pPr>
             <a:r>
               <a:rPr lang="en-US" sz="3600" dirty="0">
                 <a:latin typeface="Palatino" pitchFamily="2" charset="77"/>
@@ -5903,6 +5932,15 @@
               </a:rPr>
               <a:t>d.alexlou17@gmail.com</a:t>
             </a:r>
+          </a:p>
+          <a:p>
+            <a:pPr marL="0" indent="0">
+              <a:buNone/>
+            </a:pPr>
+            <a:endParaRPr lang="en-US" sz="3600" dirty="0">
+              <a:latin typeface="Palatino" pitchFamily="2" charset="77"/>
+              <a:ea typeface="Palatino" pitchFamily="2" charset="77"/>
+            </a:endParaRPr>
           </a:p>
         </p:txBody>
       </p:sp>
@@ -7070,7 +7108,7 @@
             <p:ph idx="1"/>
             <p:extLst>
               <p:ext uri="{D42A27DB-BD31-4B8C-83A1-F6EECF244321}">
-                <p14:modId xmlns:p14="http://schemas.microsoft.com/office/powerpoint/2010/main" val="2805799242"/>
+                <p14:modId xmlns:p14="http://schemas.microsoft.com/office/powerpoint/2010/main" val="85589118"/>
               </p:ext>
             </p:extLst>
           </p:nvPr>
@@ -7413,7 +7451,7 @@
                           <a:latin typeface="Palatino" pitchFamily="2" charset="77"/>
                           <a:ea typeface="Palatino" pitchFamily="2" charset="77"/>
                         </a:rPr>
-                        <a:t>Games played</a:t>
+                        <a:t>Number of games played</a:t>
                       </a:r>
                     </a:p>
                   </a:txBody>

</xml_diff>